<commit_message>
Update lesson 1 powerpoint
</commit_message>
<xml_diff>
--- a/Powerpoints/Intro to Python_ 1.pptx
+++ b/Powerpoints/Intro to Python_ 1.pptx
@@ -135,6 +135,11 @@
       </a:defRPr>
     </a:lvl9pPr>
   </p:defaultTextStyle>
+  <p:extLst>
+    <p:ext uri="{EFAFB233-063F-42B5-8137-9DF3F51BA10A}">
+      <p15:sldGuideLst xmlns:p15="http://schemas.microsoft.com/office/powerpoint/2012/main"/>
+    </p:ext>
+  </p:extLst>
 </p:presentation>
 </file>
 
@@ -324,7 +329,7 @@
           <a:p>
             <a:fld id="{4AAD347D-5ACD-4C99-B74B-A9C85AD731AF}" type="datetimeFigureOut">
               <a:rPr lang="en-US" dirty="0"/>
-              <a:t>9/29/2016</a:t>
+              <a:t>10/3/2016</a:t>
             </a:fld>
             <a:endParaRPr lang="en-US" dirty="0"/>
           </a:p>
@@ -594,7 +599,7 @@
           <a:p>
             <a:fld id="{4509A250-FF31-4206-8172-F9D3106AACB1}" type="datetimeFigureOut">
               <a:rPr lang="en-US" dirty="0"/>
-              <a:t>9/29/2016</a:t>
+              <a:t>10/3/2016</a:t>
             </a:fld>
             <a:endParaRPr lang="en-US" dirty="0"/>
           </a:p>
@@ -783,7 +788,7 @@
           <a:p>
             <a:fld id="{4509A250-FF31-4206-8172-F9D3106AACB1}" type="datetimeFigureOut">
               <a:rPr lang="en-US" dirty="0"/>
-              <a:t>9/29/2016</a:t>
+              <a:t>10/3/2016</a:t>
             </a:fld>
             <a:endParaRPr lang="en-US" dirty="0"/>
           </a:p>
@@ -1049,7 +1054,7 @@
           <a:p>
             <a:fld id="{4509A250-FF31-4206-8172-F9D3106AACB1}" type="datetimeFigureOut">
               <a:rPr lang="en-US" dirty="0"/>
-              <a:t>9/29/2016</a:t>
+              <a:t>10/3/2016</a:t>
             </a:fld>
             <a:endParaRPr lang="en-US" dirty="0"/>
           </a:p>
@@ -1371,7 +1376,7 @@
           <a:p>
             <a:fld id="{4509A250-FF31-4206-8172-F9D3106AACB1}" type="datetimeFigureOut">
               <a:rPr lang="en-US" dirty="0"/>
-              <a:t>9/29/2016</a:t>
+              <a:t>10/3/2016</a:t>
             </a:fld>
             <a:endParaRPr lang="en-US" dirty="0"/>
           </a:p>
@@ -1985,7 +1990,7 @@
           <a:p>
             <a:fld id="{4509A250-FF31-4206-8172-F9D3106AACB1}" type="datetimeFigureOut">
               <a:rPr lang="en-US" dirty="0"/>
-              <a:t>9/29/2016</a:t>
+              <a:t>10/3/2016</a:t>
             </a:fld>
             <a:endParaRPr lang="en-US" dirty="0"/>
           </a:p>
@@ -2827,7 +2832,7 @@
           <a:p>
             <a:fld id="{4509A250-FF31-4206-8172-F9D3106AACB1}" type="datetimeFigureOut">
               <a:rPr lang="en-US" dirty="0"/>
-              <a:t>9/29/2016</a:t>
+              <a:t>10/3/2016</a:t>
             </a:fld>
             <a:endParaRPr lang="en-US" dirty="0"/>
           </a:p>
@@ -2992,7 +2997,7 @@
           <a:p>
             <a:fld id="{4509A250-FF31-4206-8172-F9D3106AACB1}" type="datetimeFigureOut">
               <a:rPr lang="en-US" dirty="0"/>
-              <a:t>9/29/2016</a:t>
+              <a:t>10/3/2016</a:t>
             </a:fld>
             <a:endParaRPr lang="en-US" dirty="0"/>
           </a:p>
@@ -3167,7 +3172,7 @@
           <a:p>
             <a:fld id="{4509A250-FF31-4206-8172-F9D3106AACB1}" type="datetimeFigureOut">
               <a:rPr lang="en-US" dirty="0"/>
-              <a:t>9/29/2016</a:t>
+              <a:t>10/3/2016</a:t>
             </a:fld>
             <a:endParaRPr lang="en-US" dirty="0"/>
           </a:p>
@@ -3332,7 +3337,7 @@
           <a:p>
             <a:fld id="{9796027F-7875-4030-9381-8BD8C4F21935}" type="datetimeFigureOut">
               <a:rPr lang="en-US" dirty="0"/>
-              <a:t>9/29/2016</a:t>
+              <a:t>10/3/2016</a:t>
             </a:fld>
             <a:endParaRPr lang="en-US" dirty="0"/>
           </a:p>
@@ -3574,7 +3579,7 @@
           <a:p>
             <a:fld id="{9796027F-7875-4030-9381-8BD8C4F21935}" type="datetimeFigureOut">
               <a:rPr lang="en-US" dirty="0"/>
-              <a:t>9/29/2016</a:t>
+              <a:t>10/3/2016</a:t>
             </a:fld>
             <a:endParaRPr lang="en-US" dirty="0"/>
           </a:p>
@@ -3861,7 +3866,7 @@
           <a:p>
             <a:fld id="{9796027F-7875-4030-9381-8BD8C4F21935}" type="datetimeFigureOut">
               <a:rPr lang="en-US" dirty="0"/>
-              <a:t>9/29/2016</a:t>
+              <a:t>10/3/2016</a:t>
             </a:fld>
             <a:endParaRPr lang="en-US" dirty="0"/>
           </a:p>
@@ -4300,7 +4305,7 @@
           <a:p>
             <a:fld id="{9796027F-7875-4030-9381-8BD8C4F21935}" type="datetimeFigureOut">
               <a:rPr lang="en-US" dirty="0"/>
-              <a:t>9/29/2016</a:t>
+              <a:t>10/3/2016</a:t>
             </a:fld>
             <a:endParaRPr lang="en-US" dirty="0"/>
           </a:p>
@@ -4413,7 +4418,7 @@
           <a:p>
             <a:fld id="{4509A250-FF31-4206-8172-F9D3106AACB1}" type="datetimeFigureOut">
               <a:rPr lang="en-US" dirty="0"/>
-              <a:t>9/29/2016</a:t>
+              <a:t>10/3/2016</a:t>
             </a:fld>
             <a:endParaRPr lang="en-US" dirty="0"/>
           </a:p>
@@ -4503,7 +4508,7 @@
           <a:p>
             <a:fld id="{4509A250-FF31-4206-8172-F9D3106AACB1}" type="datetimeFigureOut">
               <a:rPr lang="en-US" dirty="0"/>
-              <a:t>9/29/2016</a:t>
+              <a:t>10/3/2016</a:t>
             </a:fld>
             <a:endParaRPr lang="en-US" dirty="0"/>
           </a:p>
@@ -4777,7 +4782,7 @@
           <a:p>
             <a:fld id="{4509A250-FF31-4206-8172-F9D3106AACB1}" type="datetimeFigureOut">
               <a:rPr lang="en-US" dirty="0"/>
-              <a:t>9/29/2016</a:t>
+              <a:t>10/3/2016</a:t>
             </a:fld>
             <a:endParaRPr lang="en-US" dirty="0"/>
           </a:p>
@@ -5047,7 +5052,7 @@
           <a:p>
             <a:fld id="{4509A250-FF31-4206-8172-F9D3106AACB1}" type="datetimeFigureOut">
               <a:rPr lang="en-US" dirty="0"/>
-              <a:t>9/29/2016</a:t>
+              <a:t>10/3/2016</a:t>
             </a:fld>
             <a:endParaRPr lang="en-US" dirty="0"/>
           </a:p>
@@ -5465,7 +5470,7 @@
           <a:p>
             <a:fld id="{4AAD347D-5ACD-4C99-B74B-A9C85AD731AF}" type="datetimeFigureOut">
               <a:rPr lang="en-US" dirty="0"/>
-              <a:t>9/29/2016</a:t>
+              <a:t>10/3/2016</a:t>
             </a:fld>
             <a:endParaRPr lang="en-US" dirty="0"/>
           </a:p>
@@ -10935,22 +10940,10 @@
           <a:p>
             <a:r>
               <a:rPr lang="en-US" sz="2200" dirty="0">
-                <a:hlinkClick r:id="rId2"/>
-              </a:rPr>
-              <a:t>http://interactivepython.org/runestone/static/pythonds/index.html</a:t>
-            </a:r>
-            <a:endParaRPr lang="en-US" sz="2200" dirty="0"/>
-          </a:p>
-          <a:p>
-            <a:r>
-              <a:rPr lang="en-US" sz="2200" dirty="0">
                 <a:hlinkClick r:id="rId3"/>
               </a:rPr>
-              <a:t>https://classroom.udacity.com/courses/cs101</a:t>
-            </a:r>
-            <a:endParaRPr lang="en-US" sz="2200" dirty="0"/>
-          </a:p>
-          <a:p>
+              <a:t>http://interactivepython.org</a:t>
+            </a:r>
             <a:endParaRPr lang="en-US" sz="2200" dirty="0"/>
           </a:p>
           <a:p>
@@ -10958,16 +10951,11 @@
               <a:rPr lang="en-US" sz="2200" dirty="0">
                 <a:hlinkClick r:id="rId4"/>
               </a:rPr>
-              <a:t>http://docs.python-guide.org/en/latest</a:t>
-            </a:r>
-          </a:p>
-          <a:p>
-            <a:r>
-              <a:rPr lang="en-US" sz="2200" dirty="0">
-                <a:hlinkClick r:id="rId4"/>
-              </a:rPr>
-              <a:t>http://chimera.labs.oreilly.com/books/1230000000393</a:t>
-            </a:r>
+              <a:t>https://classroom.udacity.com/courses/cs101</a:t>
+            </a:r>
+            <a:endParaRPr lang="en-US" sz="2200" dirty="0"/>
+          </a:p>
+          <a:p>
             <a:endParaRPr lang="en-US" sz="2200" dirty="0"/>
           </a:p>
           <a:p>
@@ -10975,7 +10963,15 @@
               <a:rPr lang="en-US" sz="2200" dirty="0">
                 <a:hlinkClick r:id="rId5"/>
               </a:rPr>
-              <a:t>http://pythoncentral.io</a:t>
+              <a:t>http://docs.python-guide.org/en/latest</a:t>
+            </a:r>
+          </a:p>
+          <a:p>
+            <a:r>
+              <a:rPr lang="en-US" sz="2200" dirty="0">
+                <a:hlinkClick r:id="rId5"/>
+              </a:rPr>
+              <a:t>http://chimera.labs.oreilly.com/books/1230000000393</a:t>
             </a:r>
             <a:endParaRPr lang="en-US" sz="2200" dirty="0"/>
           </a:p>
@@ -10983,6 +10979,15 @@
             <a:r>
               <a:rPr lang="en-US" sz="2200" dirty="0">
                 <a:hlinkClick r:id="rId6"/>
+              </a:rPr>
+              <a:t>http://pythoncentral.io</a:t>
+            </a:r>
+            <a:endParaRPr lang="en-US" sz="2200" dirty="0"/>
+          </a:p>
+          <a:p>
+            <a:r>
+              <a:rPr lang="en-US" sz="2200" dirty="0">
+                <a:hlinkClick r:id="rId7"/>
               </a:rPr>
               <a:t>http://www.programiz.com/python-programming</a:t>
             </a:r>

</xml_diff>